<commit_message>
Actually saved the PPT this time
</commit_message>
<xml_diff>
--- a/doc/presentations/FallProgressReport.pptx
+++ b/doc/presentations/FallProgressReport.pptx
@@ -7,12 +7,15 @@
   <p:sldIdLst>
     <p:sldId id="256" r:id="rId2"/>
     <p:sldId id="257" r:id="rId3"/>
-    <p:sldId id="258" r:id="rId4"/>
-    <p:sldId id="259" r:id="rId5"/>
-    <p:sldId id="260" r:id="rId6"/>
-    <p:sldId id="261" r:id="rId7"/>
-    <p:sldId id="262" r:id="rId8"/>
-    <p:sldId id="265" r:id="rId9"/>
+    <p:sldId id="266" r:id="rId4"/>
+    <p:sldId id="267" r:id="rId5"/>
+    <p:sldId id="268" r:id="rId6"/>
+    <p:sldId id="258" r:id="rId7"/>
+    <p:sldId id="259" r:id="rId8"/>
+    <p:sldId id="260" r:id="rId9"/>
+    <p:sldId id="261" r:id="rId10"/>
+    <p:sldId id="262" r:id="rId11"/>
+    <p:sldId id="265" r:id="rId12"/>
   </p:sldIdLst>
   <p:sldSz cx="12192000" cy="6858000"/>
   <p:notesSz cx="6858000" cy="9144000"/>
@@ -250,7 +253,7 @@
           <a:p>
             <a:fld id="{A12AF864-92BA-45AB-A704-95F6CA3F7C71}" type="datetimeFigureOut">
               <a:rPr lang="en-US" smtClean="0"/>
-              <a:t>12/4/2016</a:t>
+              <a:t>12/5/2016</a:t>
             </a:fld>
             <a:endParaRPr lang="en-US"/>
           </a:p>
@@ -420,7 +423,7 @@
           <a:p>
             <a:fld id="{A12AF864-92BA-45AB-A704-95F6CA3F7C71}" type="datetimeFigureOut">
               <a:rPr lang="en-US" smtClean="0"/>
-              <a:t>12/4/2016</a:t>
+              <a:t>12/5/2016</a:t>
             </a:fld>
             <a:endParaRPr lang="en-US"/>
           </a:p>
@@ -600,7 +603,7 @@
           <a:p>
             <a:fld id="{A12AF864-92BA-45AB-A704-95F6CA3F7C71}" type="datetimeFigureOut">
               <a:rPr lang="en-US" smtClean="0"/>
-              <a:t>12/4/2016</a:t>
+              <a:t>12/5/2016</a:t>
             </a:fld>
             <a:endParaRPr lang="en-US"/>
           </a:p>
@@ -770,7 +773,7 @@
           <a:p>
             <a:fld id="{A12AF864-92BA-45AB-A704-95F6CA3F7C71}" type="datetimeFigureOut">
               <a:rPr lang="en-US" smtClean="0"/>
-              <a:t>12/4/2016</a:t>
+              <a:t>12/5/2016</a:t>
             </a:fld>
             <a:endParaRPr lang="en-US"/>
           </a:p>
@@ -1016,7 +1019,7 @@
           <a:p>
             <a:fld id="{A12AF864-92BA-45AB-A704-95F6CA3F7C71}" type="datetimeFigureOut">
               <a:rPr lang="en-US" smtClean="0"/>
-              <a:t>12/4/2016</a:t>
+              <a:t>12/5/2016</a:t>
             </a:fld>
             <a:endParaRPr lang="en-US"/>
           </a:p>
@@ -1248,7 +1251,7 @@
           <a:p>
             <a:fld id="{A12AF864-92BA-45AB-A704-95F6CA3F7C71}" type="datetimeFigureOut">
               <a:rPr lang="en-US" smtClean="0"/>
-              <a:t>12/4/2016</a:t>
+              <a:t>12/5/2016</a:t>
             </a:fld>
             <a:endParaRPr lang="en-US"/>
           </a:p>
@@ -1615,7 +1618,7 @@
           <a:p>
             <a:fld id="{A12AF864-92BA-45AB-A704-95F6CA3F7C71}" type="datetimeFigureOut">
               <a:rPr lang="en-US" smtClean="0"/>
-              <a:t>12/4/2016</a:t>
+              <a:t>12/5/2016</a:t>
             </a:fld>
             <a:endParaRPr lang="en-US"/>
           </a:p>
@@ -1733,7 +1736,7 @@
           <a:p>
             <a:fld id="{A12AF864-92BA-45AB-A704-95F6CA3F7C71}" type="datetimeFigureOut">
               <a:rPr lang="en-US" smtClean="0"/>
-              <a:t>12/4/2016</a:t>
+              <a:t>12/5/2016</a:t>
             </a:fld>
             <a:endParaRPr lang="en-US"/>
           </a:p>
@@ -1828,7 +1831,7 @@
           <a:p>
             <a:fld id="{A12AF864-92BA-45AB-A704-95F6CA3F7C71}" type="datetimeFigureOut">
               <a:rPr lang="en-US" smtClean="0"/>
-              <a:t>12/4/2016</a:t>
+              <a:t>12/5/2016</a:t>
             </a:fld>
             <a:endParaRPr lang="en-US"/>
           </a:p>
@@ -2105,7 +2108,7 @@
           <a:p>
             <a:fld id="{A12AF864-92BA-45AB-A704-95F6CA3F7C71}" type="datetimeFigureOut">
               <a:rPr lang="en-US" smtClean="0"/>
-              <a:t>12/4/2016</a:t>
+              <a:t>12/5/2016</a:t>
             </a:fld>
             <a:endParaRPr lang="en-US"/>
           </a:p>
@@ -2362,7 +2365,7 @@
           <a:p>
             <a:fld id="{A12AF864-92BA-45AB-A704-95F6CA3F7C71}" type="datetimeFigureOut">
               <a:rPr lang="en-US" smtClean="0"/>
-              <a:t>12/4/2016</a:t>
+              <a:t>12/5/2016</a:t>
             </a:fld>
             <a:endParaRPr lang="en-US"/>
           </a:p>
@@ -2575,7 +2578,7 @@
           <a:p>
             <a:fld id="{A12AF864-92BA-45AB-A704-95F6CA3F7C71}" type="datetimeFigureOut">
               <a:rPr lang="en-US" smtClean="0"/>
-              <a:t>12/4/2016</a:t>
+              <a:t>12/5/2016</a:t>
             </a:fld>
             <a:endParaRPr lang="en-US"/>
           </a:p>
@@ -3083,6 +3086,157 @@
 </p:sld>
 </file>
 
+<file path=ppt/slides/slide10.xml><?xml version="1.0" encoding="utf-8"?>
+<p:sld xmlns:a="http://schemas.openxmlformats.org/drawingml/2006/main" xmlns:r="http://schemas.openxmlformats.org/officeDocument/2006/relationships" xmlns:p="http://schemas.openxmlformats.org/presentationml/2006/main">
+  <p:cSld>
+    <p:spTree>
+      <p:nvGrpSpPr>
+        <p:cNvPr id="1" name=""/>
+        <p:cNvGrpSpPr/>
+        <p:nvPr/>
+      </p:nvGrpSpPr>
+      <p:grpSpPr>
+        <a:xfrm>
+          <a:off x="0" y="0"/>
+          <a:ext cx="0" cy="0"/>
+          <a:chOff x="0" y="0"/>
+          <a:chExt cx="0" cy="0"/>
+        </a:xfrm>
+      </p:grpSpPr>
+      <p:sp>
+        <p:nvSpPr>
+          <p:cNvPr id="2" name="Title 1"/>
+          <p:cNvSpPr>
+            <a:spLocks noGrp="1"/>
+          </p:cNvSpPr>
+          <p:nvPr>
+            <p:ph type="title"/>
+          </p:nvPr>
+        </p:nvSpPr>
+        <p:spPr/>
+        <p:txBody>
+          <a:bodyPr/>
+          <a:lstStyle/>
+          <a:p>
+            <a:r>
+              <a:rPr lang="en-US" dirty="0"/>
+              <a:t>Retrospective of the past 10 weeks</a:t>
+            </a:r>
+          </a:p>
+        </p:txBody>
+      </p:sp>
+      <p:sp>
+        <p:nvSpPr>
+          <p:cNvPr id="3" name="Content Placeholder 2"/>
+          <p:cNvSpPr>
+            <a:spLocks noGrp="1"/>
+          </p:cNvSpPr>
+          <p:nvPr>
+            <p:ph idx="1"/>
+          </p:nvPr>
+        </p:nvSpPr>
+        <p:spPr/>
+        <p:txBody>
+          <a:bodyPr/>
+          <a:lstStyle/>
+          <a:p>
+            <a:r>
+              <a:rPr lang="en-US" dirty="0"/>
+              <a:t>Each person can go over what they have thought of the past 10 weeks</a:t>
+            </a:r>
+          </a:p>
+          <a:p>
+            <a:r>
+              <a:rPr lang="en-US"/>
+              <a:t>Any highlights</a:t>
+            </a:r>
+          </a:p>
+        </p:txBody>
+      </p:sp>
+    </p:spTree>
+    <p:extLst>
+      <p:ext uri="{BB962C8B-B14F-4D97-AF65-F5344CB8AC3E}">
+        <p14:creationId xmlns:p14="http://schemas.microsoft.com/office/powerpoint/2010/main" val="319381762"/>
+      </p:ext>
+    </p:extLst>
+  </p:cSld>
+  <p:clrMapOvr>
+    <a:masterClrMapping/>
+  </p:clrMapOvr>
+</p:sld>
+</file>
+
+<file path=ppt/slides/slide11.xml><?xml version="1.0" encoding="utf-8"?>
+<p:sld xmlns:a="http://schemas.openxmlformats.org/drawingml/2006/main" xmlns:r="http://schemas.openxmlformats.org/officeDocument/2006/relationships" xmlns:p="http://schemas.openxmlformats.org/presentationml/2006/main">
+  <p:cSld>
+    <p:spTree>
+      <p:nvGrpSpPr>
+        <p:cNvPr id="1" name=""/>
+        <p:cNvGrpSpPr/>
+        <p:nvPr/>
+      </p:nvGrpSpPr>
+      <p:grpSpPr>
+        <a:xfrm>
+          <a:off x="0" y="0"/>
+          <a:ext cx="0" cy="0"/>
+          <a:chOff x="0" y="0"/>
+          <a:chExt cx="0" cy="0"/>
+        </a:xfrm>
+      </p:grpSpPr>
+      <p:sp>
+        <p:nvSpPr>
+          <p:cNvPr id="2" name="Title 1"/>
+          <p:cNvSpPr>
+            <a:spLocks noGrp="1"/>
+          </p:cNvSpPr>
+          <p:nvPr>
+            <p:ph type="title"/>
+          </p:nvPr>
+        </p:nvSpPr>
+        <p:spPr/>
+        <p:txBody>
+          <a:bodyPr/>
+          <a:lstStyle/>
+          <a:p>
+            <a:r>
+              <a:rPr lang="en-US" dirty="0"/>
+              <a:t>Thank you for listening!</a:t>
+            </a:r>
+          </a:p>
+        </p:txBody>
+      </p:sp>
+      <p:sp>
+        <p:nvSpPr>
+          <p:cNvPr id="3" name="Content Placeholder 2"/>
+          <p:cNvSpPr>
+            <a:spLocks noGrp="1"/>
+          </p:cNvSpPr>
+          <p:nvPr>
+            <p:ph idx="1"/>
+          </p:nvPr>
+        </p:nvSpPr>
+        <p:spPr/>
+        <p:txBody>
+          <a:bodyPr/>
+          <a:lstStyle/>
+          <a:p>
+            <a:endParaRPr lang="en-US"/>
+          </a:p>
+        </p:txBody>
+      </p:sp>
+    </p:spTree>
+    <p:extLst>
+      <p:ext uri="{BB962C8B-B14F-4D97-AF65-F5344CB8AC3E}">
+        <p14:creationId xmlns:p14="http://schemas.microsoft.com/office/powerpoint/2010/main" val="482554414"/>
+      </p:ext>
+    </p:extLst>
+  </p:cSld>
+  <p:clrMapOvr>
+    <a:masterClrMapping/>
+  </p:clrMapOvr>
+</p:sld>
+</file>
+
 <file path=ppt/slides/slide2.xml><?xml version="1.0" encoding="utf-8"?>
 <p:sld xmlns:a="http://schemas.openxmlformats.org/drawingml/2006/main" xmlns:r="http://schemas.openxmlformats.org/officeDocument/2006/relationships" xmlns:p="http://schemas.openxmlformats.org/presentationml/2006/main">
   <p:cSld>
@@ -3139,27 +3293,31 @@
           <a:p>
             <a:r>
               <a:rPr lang="en-US" dirty="0"/>
-              <a:t>Got assigned to the High-Altitude Rocketry Challenge!</a:t>
-            </a:r>
-          </a:p>
-          <a:p>
-            <a:r>
-              <a:rPr lang="en-US" dirty="0"/>
-              <a:t>Project Purpose</a:t>
-            </a:r>
-          </a:p>
-          <a:p>
-            <a:pPr lvl="1"/>
-            <a:r>
-              <a:rPr lang="en-US" dirty="0"/>
-              <a:t>Create software that will track the location of the rocket</a:t>
-            </a:r>
-          </a:p>
-          <a:p>
-            <a:pPr lvl="1"/>
-            <a:r>
-              <a:rPr lang="en-US" dirty="0"/>
-              <a:t>Pretty much go over the problem statement</a:t>
+              <a:t>Launch a rocket in the Black Rock Desert</a:t>
+            </a:r>
+          </a:p>
+          <a:p>
+            <a:r>
+              <a:rPr lang="en-US" dirty="0"/>
+              <a:t>Receive telemetry and visualize in real-time</a:t>
+            </a:r>
+          </a:p>
+          <a:p>
+            <a:r>
+              <a:rPr lang="en-US" dirty="0"/>
+              <a:t>Aid in recovery</a:t>
+            </a:r>
+          </a:p>
+          <a:p>
+            <a:r>
+              <a:rPr lang="en-US" dirty="0"/>
+              <a:t>Track rocket</a:t>
+            </a:r>
+          </a:p>
+          <a:p>
+            <a:r>
+              <a:rPr lang="en-US" dirty="0"/>
+              <a:t>Log telemetry for later retrieval</a:t>
             </a:r>
           </a:p>
         </p:txBody>
@@ -3211,7 +3369,7 @@
           <a:p>
             <a:r>
               <a:rPr lang="en-US" dirty="0"/>
-              <a:t>Project Goals</a:t>
+              <a:t>Our Clients</a:t>
             </a:r>
           </a:p>
         </p:txBody>
@@ -3233,24 +3391,33 @@
           <a:p>
             <a:r>
               <a:rPr lang="en-US" dirty="0"/>
-              <a:t>We can each talk about the goals of the project..</a:t>
-            </a:r>
-          </a:p>
-          <a:p>
-            <a:r>
-              <a:rPr lang="en-US" dirty="0"/>
-              <a:t>This will be pulling information from the Requirements Document</a:t>
-            </a:r>
-          </a:p>
-          <a:p>
-            <a:endParaRPr lang="en-US" dirty="0"/>
+              <a:t>High-Altitude Rocketry Team</a:t>
+            </a:r>
+          </a:p>
+          <a:p>
+            <a:r>
+              <a:rPr lang="en-US" dirty="0"/>
+              <a:t>Led by Dr. Nancy Squires</a:t>
+            </a:r>
+          </a:p>
+          <a:p>
+            <a:r>
+              <a:rPr lang="en-US" dirty="0"/>
+              <a:t>Clients are engineering students</a:t>
+            </a:r>
+          </a:p>
+          <a:p>
+            <a:r>
+              <a:rPr lang="en-US" dirty="0"/>
+              <a:t>Software team given a lot of flexibility</a:t>
+            </a:r>
           </a:p>
         </p:txBody>
       </p:sp>
     </p:spTree>
     <p:extLst>
       <p:ext uri="{BB962C8B-B14F-4D97-AF65-F5344CB8AC3E}">
-        <p14:creationId xmlns:p14="http://schemas.microsoft.com/office/powerpoint/2010/main" val="3438592189"/>
+        <p14:creationId xmlns:p14="http://schemas.microsoft.com/office/powerpoint/2010/main" val="335330661"/>
       </p:ext>
     </p:extLst>
   </p:cSld>
@@ -3294,7 +3461,7 @@
           <a:p>
             <a:r>
               <a:rPr lang="en-US" dirty="0"/>
-              <a:t>Problems</a:t>
+              <a:t>Telemetry</a:t>
             </a:r>
           </a:p>
         </p:txBody>
@@ -3316,25 +3483,31 @@
           <a:p>
             <a:r>
               <a:rPr lang="en-US" dirty="0"/>
-              <a:t>Any problems that we have run into</a:t>
-            </a:r>
-          </a:p>
-          <a:p>
-            <a:r>
-              <a:rPr lang="en-US" dirty="0"/>
-              <a:t>GPS signal (cutting out)</a:t>
-            </a:r>
-          </a:p>
-          <a:p>
-            <a:r>
-              <a:rPr lang="en-US" dirty="0"/>
-              <a:t>Enough Battery Power</a:t>
-            </a:r>
-          </a:p>
-          <a:p>
-            <a:r>
-              <a:rPr lang="en-US" dirty="0"/>
-              <a:t>No Wi-Fi connection</a:t>
+              <a:t>Receive telemetry from the rocket over packet radio</a:t>
+            </a:r>
+          </a:p>
+          <a:p>
+            <a:r>
+              <a:rPr lang="en-US" dirty="0"/>
+              <a:t>Translate to serial protocol by avionics team</a:t>
+            </a:r>
+          </a:p>
+          <a:p>
+            <a:r>
+              <a:rPr lang="en-US" dirty="0"/>
+              <a:t>Read by Raspberry Pi through serial port</a:t>
+            </a:r>
+          </a:p>
+          <a:p>
+            <a:r>
+              <a:rPr lang="en-US" dirty="0"/>
+              <a:t>COCOM limits will cause us to lose GPS data</a:t>
+            </a:r>
+          </a:p>
+          <a:p>
+            <a:r>
+              <a:rPr lang="en-US" dirty="0"/>
+              <a:t>Create location prediction system</a:t>
             </a:r>
           </a:p>
         </p:txBody>
@@ -3342,7 +3515,7 @@
     </p:spTree>
     <p:extLst>
       <p:ext uri="{BB962C8B-B14F-4D97-AF65-F5344CB8AC3E}">
-        <p14:creationId xmlns:p14="http://schemas.microsoft.com/office/powerpoint/2010/main" val="522299762"/>
+        <p14:creationId xmlns:p14="http://schemas.microsoft.com/office/powerpoint/2010/main" val="1888142444"/>
       </p:ext>
     </p:extLst>
   </p:cSld>
@@ -3386,7 +3559,7 @@
           <a:p>
             <a:r>
               <a:rPr lang="en-US" dirty="0"/>
-              <a:t>Proposed Solutions</a:t>
+              <a:t>Backend</a:t>
             </a:r>
           </a:p>
         </p:txBody>
@@ -3403,18 +3576,61 @@
         </p:nvSpPr>
         <p:spPr/>
         <p:txBody>
-          <a:bodyPr/>
-          <a:lstStyle/>
-          <a:p>
-            <a:r>
-              <a:rPr lang="en-US" dirty="0"/>
-              <a:t>Creating a local web page with local Wi-Fi</a:t>
-            </a:r>
-          </a:p>
-          <a:p>
-            <a:r>
-              <a:rPr lang="en-US" dirty="0"/>
-              <a:t>Cover kind of what we went over in the technical document</a:t>
+          <a:bodyPr>
+            <a:normAutofit/>
+          </a:bodyPr>
+          <a:lstStyle/>
+          <a:p>
+            <a:r>
+              <a:rPr lang="en-US" dirty="0"/>
+              <a:t>Raspberry Pi</a:t>
+            </a:r>
+          </a:p>
+          <a:p>
+            <a:r>
+              <a:rPr lang="en-US" dirty="0"/>
+              <a:t>Backend written in Node</a:t>
+            </a:r>
+          </a:p>
+          <a:p>
+            <a:pPr lvl="1"/>
+            <a:r>
+              <a:rPr lang="en-US" dirty="0"/>
+              <a:t>One language (JavaScript) for whole system</a:t>
+            </a:r>
+          </a:p>
+          <a:p>
+            <a:pPr lvl="1"/>
+            <a:r>
+              <a:rPr lang="en-US" dirty="0"/>
+              <a:t>Reuse libraries</a:t>
+            </a:r>
+          </a:p>
+          <a:p>
+            <a:pPr lvl="1"/>
+            <a:r>
+              <a:rPr lang="en-US" dirty="0"/>
+              <a:t>One package manager (NPM)</a:t>
+            </a:r>
+          </a:p>
+          <a:p>
+            <a:pPr lvl="1"/>
+            <a:r>
+              <a:rPr lang="en-US" dirty="0"/>
+              <a:t>Event driven architecture</a:t>
+            </a:r>
+          </a:p>
+          <a:p>
+            <a:pPr lvl="1"/>
+            <a:r>
+              <a:rPr lang="en-US" dirty="0"/>
+              <a:t>Fast</a:t>
+            </a:r>
+          </a:p>
+          <a:p>
+            <a:r>
+              <a:rPr lang="en-US" dirty="0"/>
+              <a:t>Telemetry converted to JSON and transferred to client</a:t>
             </a:r>
           </a:p>
         </p:txBody>
@@ -3422,7 +3638,7 @@
     </p:spTree>
     <p:extLst>
       <p:ext uri="{BB962C8B-B14F-4D97-AF65-F5344CB8AC3E}">
-        <p14:creationId xmlns:p14="http://schemas.microsoft.com/office/powerpoint/2010/main" val="2309632490"/>
+        <p14:creationId xmlns:p14="http://schemas.microsoft.com/office/powerpoint/2010/main" val="2391912560"/>
       </p:ext>
     </p:extLst>
   </p:cSld>
@@ -3465,12 +3681,8 @@
           <a:lstStyle/>
           <a:p>
             <a:r>
-              <a:rPr lang="en-US" dirty="0" err="1"/>
-              <a:t>WebGL</a:t>
-            </a:r>
-            <a:r>
-              <a:rPr lang="en-US" dirty="0"/>
-              <a:t> Demo</a:t>
+              <a:rPr lang="en-US" dirty="0"/>
+              <a:t>Project Goals</a:t>
             </a:r>
           </a:p>
         </p:txBody>
@@ -3492,15 +3704,24 @@
           <a:p>
             <a:r>
               <a:rPr lang="en-US" dirty="0"/>
-              <a:t>Include GIF of what is happening</a:t>
-            </a:r>
+              <a:t>We can each talk about the goals of the project..</a:t>
+            </a:r>
+          </a:p>
+          <a:p>
+            <a:r>
+              <a:rPr lang="en-US" dirty="0"/>
+              <a:t>This will be pulling information from the Requirements Document</a:t>
+            </a:r>
+          </a:p>
+          <a:p>
+            <a:endParaRPr lang="en-US" dirty="0"/>
           </a:p>
         </p:txBody>
       </p:sp>
     </p:spTree>
     <p:extLst>
       <p:ext uri="{BB962C8B-B14F-4D97-AF65-F5344CB8AC3E}">
-        <p14:creationId xmlns:p14="http://schemas.microsoft.com/office/powerpoint/2010/main" val="2004471334"/>
+        <p14:creationId xmlns:p14="http://schemas.microsoft.com/office/powerpoint/2010/main" val="3438592189"/>
       </p:ext>
     </p:extLst>
   </p:cSld>
@@ -3544,7 +3765,7 @@
           <a:p>
             <a:r>
               <a:rPr lang="en-US" dirty="0"/>
-              <a:t>Retrospective of the past 10 weeks</a:t>
+              <a:t>Problems</a:t>
             </a:r>
           </a:p>
         </p:txBody>
@@ -3566,13 +3787,25 @@
           <a:p>
             <a:r>
               <a:rPr lang="en-US" dirty="0"/>
-              <a:t>Each person can go over what they have thought of the past 10 weeks</a:t>
-            </a:r>
-          </a:p>
-          <a:p>
-            <a:r>
-              <a:rPr lang="en-US"/>
-              <a:t>Any highlights</a:t>
+              <a:t>Any problems that we have run into</a:t>
+            </a:r>
+          </a:p>
+          <a:p>
+            <a:r>
+              <a:rPr lang="en-US" dirty="0"/>
+              <a:t>GPS signal (cutting out)</a:t>
+            </a:r>
+          </a:p>
+          <a:p>
+            <a:r>
+              <a:rPr lang="en-US" dirty="0"/>
+              <a:t>Enough Battery Power</a:t>
+            </a:r>
+          </a:p>
+          <a:p>
+            <a:r>
+              <a:rPr lang="en-US" dirty="0"/>
+              <a:t>No Wi-Fi connection</a:t>
             </a:r>
           </a:p>
         </p:txBody>
@@ -3580,7 +3813,7 @@
     </p:spTree>
     <p:extLst>
       <p:ext uri="{BB962C8B-B14F-4D97-AF65-F5344CB8AC3E}">
-        <p14:creationId xmlns:p14="http://schemas.microsoft.com/office/powerpoint/2010/main" val="319381762"/>
+        <p14:creationId xmlns:p14="http://schemas.microsoft.com/office/powerpoint/2010/main" val="522299762"/>
       </p:ext>
     </p:extLst>
   </p:cSld>
@@ -3624,7 +3857,7 @@
           <a:p>
             <a:r>
               <a:rPr lang="en-US" dirty="0"/>
-              <a:t>Thank you for listening!</a:t>
+              <a:t>Proposed Solutions</a:t>
             </a:r>
           </a:p>
         </p:txBody>
@@ -3644,14 +3877,101 @@
           <a:bodyPr/>
           <a:lstStyle/>
           <a:p>
-            <a:endParaRPr lang="en-US"/>
+            <a:r>
+              <a:rPr lang="en-US" dirty="0"/>
+              <a:t>Creating a local web page with local Wi-Fi</a:t>
+            </a:r>
+          </a:p>
+          <a:p>
+            <a:r>
+              <a:rPr lang="en-US" dirty="0"/>
+              <a:t>Cover kind of what we went over in the technical document</a:t>
+            </a:r>
           </a:p>
         </p:txBody>
       </p:sp>
     </p:spTree>
     <p:extLst>
       <p:ext uri="{BB962C8B-B14F-4D97-AF65-F5344CB8AC3E}">
-        <p14:creationId xmlns:p14="http://schemas.microsoft.com/office/powerpoint/2010/main" val="482554414"/>
+        <p14:creationId xmlns:p14="http://schemas.microsoft.com/office/powerpoint/2010/main" val="2309632490"/>
+      </p:ext>
+    </p:extLst>
+  </p:cSld>
+  <p:clrMapOvr>
+    <a:masterClrMapping/>
+  </p:clrMapOvr>
+</p:sld>
+</file>
+
+<file path=ppt/slides/slide9.xml><?xml version="1.0" encoding="utf-8"?>
+<p:sld xmlns:a="http://schemas.openxmlformats.org/drawingml/2006/main" xmlns:r="http://schemas.openxmlformats.org/officeDocument/2006/relationships" xmlns:p="http://schemas.openxmlformats.org/presentationml/2006/main">
+  <p:cSld>
+    <p:spTree>
+      <p:nvGrpSpPr>
+        <p:cNvPr id="1" name=""/>
+        <p:cNvGrpSpPr/>
+        <p:nvPr/>
+      </p:nvGrpSpPr>
+      <p:grpSpPr>
+        <a:xfrm>
+          <a:off x="0" y="0"/>
+          <a:ext cx="0" cy="0"/>
+          <a:chOff x="0" y="0"/>
+          <a:chExt cx="0" cy="0"/>
+        </a:xfrm>
+      </p:grpSpPr>
+      <p:sp>
+        <p:nvSpPr>
+          <p:cNvPr id="2" name="Title 1"/>
+          <p:cNvSpPr>
+            <a:spLocks noGrp="1"/>
+          </p:cNvSpPr>
+          <p:nvPr>
+            <p:ph type="title"/>
+          </p:nvPr>
+        </p:nvSpPr>
+        <p:spPr/>
+        <p:txBody>
+          <a:bodyPr/>
+          <a:lstStyle/>
+          <a:p>
+            <a:r>
+              <a:rPr lang="en-US" dirty="0" err="1"/>
+              <a:t>WebGL</a:t>
+            </a:r>
+            <a:r>
+              <a:rPr lang="en-US" dirty="0"/>
+              <a:t> Demo</a:t>
+            </a:r>
+          </a:p>
+        </p:txBody>
+      </p:sp>
+      <p:sp>
+        <p:nvSpPr>
+          <p:cNvPr id="3" name="Content Placeholder 2"/>
+          <p:cNvSpPr>
+            <a:spLocks noGrp="1"/>
+          </p:cNvSpPr>
+          <p:nvPr>
+            <p:ph idx="1"/>
+          </p:nvPr>
+        </p:nvSpPr>
+        <p:spPr/>
+        <p:txBody>
+          <a:bodyPr/>
+          <a:lstStyle/>
+          <a:p>
+            <a:r>
+              <a:rPr lang="en-US" dirty="0"/>
+              <a:t>Include GIF of what is happening</a:t>
+            </a:r>
+          </a:p>
+        </p:txBody>
+      </p:sp>
+    </p:spTree>
+    <p:extLst>
+      <p:ext uri="{BB962C8B-B14F-4D97-AF65-F5344CB8AC3E}">
+        <p14:creationId xmlns:p14="http://schemas.microsoft.com/office/powerpoint/2010/main" val="2004471334"/>
       </p:ext>
     </p:extLst>
   </p:cSld>

</xml_diff>

<commit_message>
Added slides to powerpoint
</commit_message>
<xml_diff>
--- a/doc/presentations/FallProgressReport.pptx
+++ b/doc/presentations/FallProgressReport.pptx
@@ -10,10 +10,10 @@
     <p:sldId id="266" r:id="rId4"/>
     <p:sldId id="267" r:id="rId5"/>
     <p:sldId id="268" r:id="rId6"/>
-    <p:sldId id="269" r:id="rId7"/>
-    <p:sldId id="258" r:id="rId8"/>
-    <p:sldId id="259" r:id="rId9"/>
-    <p:sldId id="260" r:id="rId10"/>
+    <p:sldId id="270" r:id="rId7"/>
+    <p:sldId id="271" r:id="rId8"/>
+    <p:sldId id="269" r:id="rId9"/>
+    <p:sldId id="258" r:id="rId10"/>
     <p:sldId id="261" r:id="rId11"/>
     <p:sldId id="262" r:id="rId12"/>
     <p:sldId id="265" r:id="rId13"/>
@@ -3399,6 +3399,12 @@
               <a:t>Log telemetry for later retrieval</a:t>
             </a:r>
           </a:p>
+          <a:p>
+            <a:r>
+              <a:rPr lang="en-US" dirty="0"/>
+              <a:t>Create a usable user interface</a:t>
+            </a:r>
+          </a:p>
         </p:txBody>
       </p:sp>
     </p:spTree>
@@ -3790,7 +3796,7 @@
           <a:p>
             <a:r>
               <a:rPr lang="en-US" dirty="0"/>
-              <a:t>Plans</a:t>
+              <a:t>Frontend and Web Browser</a:t>
             </a:r>
           </a:p>
         </p:txBody>
@@ -3807,69 +3813,37 @@
         </p:nvSpPr>
         <p:spPr/>
         <p:txBody>
-          <a:bodyPr>
-            <a:normAutofit/>
-          </a:bodyPr>
-          <a:lstStyle/>
-          <a:p>
-            <a:r>
-              <a:rPr lang="en-US" dirty="0"/>
-              <a:t>Create terrain rendering prototype</a:t>
+          <a:bodyPr/>
+          <a:lstStyle/>
+          <a:p>
+            <a:r>
+              <a:rPr lang="en-US"/>
+              <a:t>WebGL</a:t>
+            </a:r>
+            <a:endParaRPr lang="en-US" dirty="0"/>
+          </a:p>
+          <a:p>
+            <a:r>
+              <a:rPr lang="en-US" dirty="0"/>
+              <a:t>3.js</a:t>
             </a:r>
           </a:p>
           <a:p>
             <a:pPr lvl="1"/>
             <a:r>
               <a:rPr lang="en-US" dirty="0"/>
-              <a:t>How to render distant terrain efficiently?</a:t>
-            </a:r>
-          </a:p>
-          <a:p>
-            <a:r>
-              <a:rPr lang="en-US" dirty="0"/>
-              <a:t>Better work tracking system</a:t>
-            </a:r>
-          </a:p>
-          <a:p>
-            <a:pPr lvl="1"/>
-            <a:r>
-              <a:rPr lang="en-US" dirty="0"/>
-              <a:t>GitHub issues</a:t>
-            </a:r>
-          </a:p>
-          <a:p>
-            <a:pPr lvl="1"/>
-            <a:r>
-              <a:rPr lang="en-US" dirty="0"/>
-              <a:t>GitHub projects</a:t>
-            </a:r>
-          </a:p>
-          <a:p>
-            <a:pPr lvl="1"/>
-            <a:r>
-              <a:rPr lang="en-US" dirty="0"/>
-              <a:t>Waffle.io?</a:t>
-            </a:r>
-          </a:p>
-          <a:p>
-            <a:r>
-              <a:rPr lang="en-US" dirty="0"/>
-              <a:t>Start on backend in Winter term</a:t>
-            </a:r>
-          </a:p>
-          <a:p>
-            <a:pPr lvl="1"/>
-            <a:r>
-              <a:rPr lang="en-US" dirty="0"/>
-              <a:t>Test flight in March</a:t>
-            </a:r>
+              <a:t>Nik- Scientific Visualization</a:t>
+            </a:r>
+          </a:p>
+          <a:p>
+            <a:endParaRPr lang="en-US" dirty="0"/>
           </a:p>
         </p:txBody>
       </p:sp>
     </p:spTree>
     <p:extLst>
       <p:ext uri="{BB962C8B-B14F-4D97-AF65-F5344CB8AC3E}">
-        <p14:creationId xmlns:p14="http://schemas.microsoft.com/office/powerpoint/2010/main" val="3994290867"/>
+        <p14:creationId xmlns:p14="http://schemas.microsoft.com/office/powerpoint/2010/main" val="2730631744"/>
       </p:ext>
     </p:extLst>
   </p:cSld>
@@ -3913,7 +3887,7 @@
           <a:p>
             <a:r>
               <a:rPr lang="en-US" dirty="0"/>
-              <a:t>Project Goals</a:t>
+              <a:t>User Interface</a:t>
             </a:r>
           </a:p>
         </p:txBody>
@@ -3933,26 +3907,81 @@
           <a:bodyPr/>
           <a:lstStyle/>
           <a:p>
-            <a:r>
-              <a:rPr lang="en-US" dirty="0"/>
-              <a:t>We can each talk about the goals of the project..</a:t>
-            </a:r>
-          </a:p>
-          <a:p>
-            <a:r>
-              <a:rPr lang="en-US" dirty="0"/>
-              <a:t>This will be pulling information from the Requirements Document</a:t>
-            </a:r>
-          </a:p>
-          <a:p>
+            <a:pPr marL="0" indent="0">
+              <a:buNone/>
+            </a:pPr>
             <a:endParaRPr lang="en-US" dirty="0"/>
           </a:p>
-        </p:txBody>
-      </p:sp>
+          <a:p>
+            <a:r>
+              <a:rPr lang="en-US" dirty="0"/>
+              <a:t>3D Environment</a:t>
+            </a:r>
+          </a:p>
+          <a:p>
+            <a:r>
+              <a:rPr lang="en-US" dirty="0"/>
+              <a:t>3D View</a:t>
+            </a:r>
+          </a:p>
+          <a:p>
+            <a:r>
+              <a:rPr lang="en-US" dirty="0"/>
+              <a:t>Numerical Data</a:t>
+            </a:r>
+          </a:p>
+          <a:p>
+            <a:r>
+              <a:rPr lang="en-US" dirty="0"/>
+              <a:t>Data Visualization</a:t>
+            </a:r>
+          </a:p>
+          <a:p>
+            <a:pPr lvl="1"/>
+            <a:r>
+              <a:rPr lang="en-US" dirty="0"/>
+              <a:t>Mike Bailey</a:t>
+            </a:r>
+          </a:p>
+          <a:p>
+            <a:endParaRPr lang="en-US" dirty="0"/>
+          </a:p>
+        </p:txBody>
+      </p:sp>
+      <p:pic>
+        <p:nvPicPr>
+          <p:cNvPr id="4" name="Picture 3"/>
+          <p:cNvPicPr>
+            <a:picLocks noChangeAspect="1"/>
+          </p:cNvPicPr>
+          <p:nvPr/>
+        </p:nvPicPr>
+        <p:blipFill>
+          <a:blip r:embed="rId2">
+            <a:extLst>
+              <a:ext uri="{28A0092B-C50C-407E-A947-70E740481C1C}">
+                <a14:useLocalDpi xmlns:a14="http://schemas.microsoft.com/office/drawing/2010/main" val="0"/>
+              </a:ext>
+            </a:extLst>
+          </a:blip>
+          <a:stretch>
+            <a:fillRect/>
+          </a:stretch>
+        </p:blipFill>
+        <p:spPr>
+          <a:xfrm>
+            <a:off x="7820608" y="700088"/>
+            <a:ext cx="3810000" cy="5476875"/>
+          </a:xfrm>
+          <a:prstGeom prst="rect">
+            <a:avLst/>
+          </a:prstGeom>
+        </p:spPr>
+      </p:pic>
     </p:spTree>
     <p:extLst>
       <p:ext uri="{BB962C8B-B14F-4D97-AF65-F5344CB8AC3E}">
-        <p14:creationId xmlns:p14="http://schemas.microsoft.com/office/powerpoint/2010/main" val="3438592189"/>
+        <p14:creationId xmlns:p14="http://schemas.microsoft.com/office/powerpoint/2010/main" val="2810092203"/>
       </p:ext>
     </p:extLst>
   </p:cSld>
@@ -3996,7 +4025,7 @@
           <a:p>
             <a:r>
               <a:rPr lang="en-US" dirty="0"/>
-              <a:t>Problems</a:t>
+              <a:t>Plans</a:t>
             </a:r>
           </a:p>
         </p:txBody>
@@ -4013,30 +4042,61 @@
         </p:nvSpPr>
         <p:spPr/>
         <p:txBody>
-          <a:bodyPr/>
-          <a:lstStyle/>
-          <a:p>
-            <a:r>
-              <a:rPr lang="en-US" dirty="0"/>
-              <a:t>Any problems that we have run into</a:t>
-            </a:r>
-          </a:p>
-          <a:p>
-            <a:r>
-              <a:rPr lang="en-US" dirty="0"/>
-              <a:t>GPS signal (cutting out)</a:t>
-            </a:r>
-          </a:p>
-          <a:p>
-            <a:r>
-              <a:rPr lang="en-US" dirty="0"/>
-              <a:t>Enough Battery Power</a:t>
-            </a:r>
-          </a:p>
-          <a:p>
-            <a:r>
-              <a:rPr lang="en-US" dirty="0"/>
-              <a:t>No Wi-Fi connection</a:t>
+          <a:bodyPr>
+            <a:normAutofit/>
+          </a:bodyPr>
+          <a:lstStyle/>
+          <a:p>
+            <a:r>
+              <a:rPr lang="en-US" dirty="0"/>
+              <a:t>Create terrain rendering prototype</a:t>
+            </a:r>
+          </a:p>
+          <a:p>
+            <a:pPr lvl="1"/>
+            <a:r>
+              <a:rPr lang="en-US" dirty="0"/>
+              <a:t>How to render distant terrain efficiently?</a:t>
+            </a:r>
+          </a:p>
+          <a:p>
+            <a:r>
+              <a:rPr lang="en-US" dirty="0"/>
+              <a:t>Better work tracking system</a:t>
+            </a:r>
+          </a:p>
+          <a:p>
+            <a:pPr lvl="1"/>
+            <a:r>
+              <a:rPr lang="en-US" dirty="0"/>
+              <a:t>GitHub issues</a:t>
+            </a:r>
+          </a:p>
+          <a:p>
+            <a:pPr lvl="1"/>
+            <a:r>
+              <a:rPr lang="en-US" dirty="0"/>
+              <a:t>GitHub projects</a:t>
+            </a:r>
+          </a:p>
+          <a:p>
+            <a:pPr lvl="1"/>
+            <a:r>
+              <a:rPr lang="en-US" dirty="0"/>
+              <a:t>Waffle.io?</a:t>
+            </a:r>
+          </a:p>
+          <a:p>
+            <a:r>
+              <a:rPr lang="en-US" dirty="0"/>
+              <a:t>Start on backend in Winter term</a:t>
+            </a:r>
+          </a:p>
+          <a:p>
+            <a:pPr lvl="1"/>
+            <a:r>
+              <a:rPr lang="en-US" dirty="0"/>
+              <a:t>Test flight in March</a:t>
             </a:r>
           </a:p>
         </p:txBody>
@@ -4044,7 +4104,7 @@
     </p:spTree>
     <p:extLst>
       <p:ext uri="{BB962C8B-B14F-4D97-AF65-F5344CB8AC3E}">
-        <p14:creationId xmlns:p14="http://schemas.microsoft.com/office/powerpoint/2010/main" val="522299762"/>
+        <p14:creationId xmlns:p14="http://schemas.microsoft.com/office/powerpoint/2010/main" val="3994290867"/>
       </p:ext>
     </p:extLst>
   </p:cSld>
@@ -4088,7 +4148,7 @@
           <a:p>
             <a:r>
               <a:rPr lang="en-US" dirty="0"/>
-              <a:t>Proposed Solutions</a:t>
+              <a:t>Project Goals</a:t>
             </a:r>
           </a:p>
         </p:txBody>
@@ -4110,21 +4170,24 @@
           <a:p>
             <a:r>
               <a:rPr lang="en-US" dirty="0"/>
-              <a:t>Creating a local web page with local Wi-Fi</a:t>
-            </a:r>
-          </a:p>
-          <a:p>
-            <a:r>
-              <a:rPr lang="en-US" dirty="0"/>
-              <a:t>Cover kind of what we went over in the technical document</a:t>
-            </a:r>
+              <a:t>We can each talk about the goals of the project..</a:t>
+            </a:r>
+          </a:p>
+          <a:p>
+            <a:r>
+              <a:rPr lang="en-US" dirty="0"/>
+              <a:t>This will be pulling information from the Requirements Document</a:t>
+            </a:r>
+          </a:p>
+          <a:p>
+            <a:endParaRPr lang="en-US" dirty="0"/>
           </a:p>
         </p:txBody>
       </p:sp>
     </p:spTree>
     <p:extLst>
       <p:ext uri="{BB962C8B-B14F-4D97-AF65-F5344CB8AC3E}">
-        <p14:creationId xmlns:p14="http://schemas.microsoft.com/office/powerpoint/2010/main" val="2309632490"/>
+        <p14:creationId xmlns:p14="http://schemas.microsoft.com/office/powerpoint/2010/main" val="3438592189"/>
       </p:ext>
     </p:extLst>
   </p:cSld>

</xml_diff>